<commit_message>
fine presentazione manca solo immagini
</commit_message>
<xml_diff>
--- a/Presentazione_IngSoft.pptx
+++ b/Presentazione_IngSoft.pptx
@@ -22,7 +22,7 @@
     <p:sldId id="268" r:id="rId16"/>
     <p:sldId id="272" r:id="rId17"/>
     <p:sldId id="275" r:id="rId18"/>
-    <p:sldId id="274" r:id="rId19"/>
+    <p:sldId id="276" r:id="rId19"/>
     <p:sldId id="263" r:id="rId20"/>
   </p:sldIdLst>
   <p:sldSz cx="12192000" cy="6858000"/>
@@ -12682,7 +12682,7 @@
           </p:cNvPicPr>
           <p:nvPr/>
         </p:nvPicPr>
-        <p:blipFill>
+        <p:blipFill rotWithShape="1">
           <a:blip r:embed="rId3">
             <a:extLst>
               <a:ext uri="{28A0092B-C50C-407E-A947-70E740481C1C}">
@@ -12690,14 +12690,13 @@
               </a:ext>
             </a:extLst>
           </a:blip>
-          <a:stretch>
-            <a:fillRect/>
-          </a:stretch>
+          <a:srcRect b="51384"/>
+          <a:stretch/>
         </p:blipFill>
         <p:spPr>
           <a:xfrm>
-            <a:off x="6096000" y="1657314"/>
-            <a:ext cx="5453062" cy="3340000"/>
+            <a:off x="5407446" y="1492622"/>
+            <a:ext cx="6141616" cy="1828800"/>
           </a:xfrm>
           <a:prstGeom prst="rect">
             <a:avLst/>
@@ -12734,6 +12733,41 @@
           <a:xfrm>
             <a:off x="9470117" y="-522059"/>
             <a:ext cx="2618772" cy="2618772"/>
+          </a:xfrm>
+          <a:prstGeom prst="rect">
+            <a:avLst/>
+          </a:prstGeom>
+        </p:spPr>
+      </p:pic>
+      <p:pic>
+        <p:nvPicPr>
+          <p:cNvPr id="14" name="Immagine 13">
+            <a:extLst>
+              <a:ext uri="{FF2B5EF4-FFF2-40B4-BE49-F238E27FC236}">
+                <a16:creationId xmlns:a16="http://schemas.microsoft.com/office/drawing/2014/main" id="{04CC5CA2-0841-238F-A32B-B855AD05748C}"/>
+              </a:ext>
+            </a:extLst>
+          </p:cNvPr>
+          <p:cNvPicPr>
+            <a:picLocks noChangeAspect="1"/>
+          </p:cNvPicPr>
+          <p:nvPr/>
+        </p:nvPicPr>
+        <p:blipFill rotWithShape="1">
+          <a:blip r:embed="rId3">
+            <a:extLst>
+              <a:ext uri="{28A0092B-C50C-407E-A947-70E740481C1C}">
+                <a14:useLocalDpi xmlns:a14="http://schemas.microsoft.com/office/drawing/2010/main" val="0"/>
+              </a:ext>
+            </a:extLst>
+          </a:blip>
+          <a:srcRect t="48644"/>
+          <a:stretch/>
+        </p:blipFill>
+        <p:spPr>
+          <a:xfrm>
+            <a:off x="5933029" y="3429000"/>
+            <a:ext cx="6155860" cy="1936378"/>
           </a:xfrm>
           <a:prstGeom prst="rect">
             <a:avLst/>
@@ -12879,6 +12913,87 @@
                                   </p:childTnLst>
                                 </p:cTn>
                               </p:par>
+                              <p:par>
+                                <p:cTn id="10" presetID="53" presetClass="entr" presetSubtype="16" fill="hold" nodeType="withEffect">
+                                  <p:stCondLst>
+                                    <p:cond delay="0"/>
+                                  </p:stCondLst>
+                                  <p:childTnLst>
+                                    <p:set>
+                                      <p:cBhvr>
+                                        <p:cTn id="11" dur="1" fill="hold">
+                                          <p:stCondLst>
+                                            <p:cond delay="0"/>
+                                          </p:stCondLst>
+                                        </p:cTn>
+                                        <p:tgtEl>
+                                          <p:spTgt spid="6"/>
+                                        </p:tgtEl>
+                                        <p:attrNameLst>
+                                          <p:attrName>style.visibility</p:attrName>
+                                        </p:attrNameLst>
+                                      </p:cBhvr>
+                                      <p:to>
+                                        <p:strVal val="visible"/>
+                                      </p:to>
+                                    </p:set>
+                                    <p:anim calcmode="lin" valueType="num">
+                                      <p:cBhvr>
+                                        <p:cTn id="12" dur="1000" fill="hold"/>
+                                        <p:tgtEl>
+                                          <p:spTgt spid="6"/>
+                                        </p:tgtEl>
+                                        <p:attrNameLst>
+                                          <p:attrName>ppt_w</p:attrName>
+                                        </p:attrNameLst>
+                                      </p:cBhvr>
+                                      <p:tavLst>
+                                        <p:tav tm="0">
+                                          <p:val>
+                                            <p:fltVal val="0"/>
+                                          </p:val>
+                                        </p:tav>
+                                        <p:tav tm="100000">
+                                          <p:val>
+                                            <p:strVal val="#ppt_w"/>
+                                          </p:val>
+                                        </p:tav>
+                                      </p:tavLst>
+                                    </p:anim>
+                                    <p:anim calcmode="lin" valueType="num">
+                                      <p:cBhvr>
+                                        <p:cTn id="13" dur="1000" fill="hold"/>
+                                        <p:tgtEl>
+                                          <p:spTgt spid="6"/>
+                                        </p:tgtEl>
+                                        <p:attrNameLst>
+                                          <p:attrName>ppt_h</p:attrName>
+                                        </p:attrNameLst>
+                                      </p:cBhvr>
+                                      <p:tavLst>
+                                        <p:tav tm="0">
+                                          <p:val>
+                                            <p:fltVal val="0"/>
+                                          </p:val>
+                                        </p:tav>
+                                        <p:tav tm="100000">
+                                          <p:val>
+                                            <p:strVal val="#ppt_h"/>
+                                          </p:val>
+                                        </p:tav>
+                                      </p:tavLst>
+                                    </p:anim>
+                                    <p:animEffect transition="in" filter="fade">
+                                      <p:cBhvr>
+                                        <p:cTn id="14" dur="1000"/>
+                                        <p:tgtEl>
+                                          <p:spTgt spid="6"/>
+                                        </p:tgtEl>
+                                      </p:cBhvr>
+                                    </p:animEffect>
+                                  </p:childTnLst>
+                                </p:cTn>
+                              </p:par>
                             </p:childTnLst>
                           </p:cTn>
                         </p:par>
@@ -12886,26 +13001,26 @@
                     </p:cTn>
                   </p:par>
                   <p:par>
-                    <p:cTn id="10" fill="hold">
+                    <p:cTn id="15" fill="hold">
                       <p:stCondLst>
                         <p:cond delay="indefinite"/>
                       </p:stCondLst>
                       <p:childTnLst>
                         <p:par>
-                          <p:cTn id="11" fill="hold">
+                          <p:cTn id="16" fill="hold">
                             <p:stCondLst>
                               <p:cond delay="0"/>
                             </p:stCondLst>
                             <p:childTnLst>
                               <p:par>
-                                <p:cTn id="12" presetID="42" presetClass="entr" presetSubtype="0" fill="hold" grpId="0" nodeType="clickEffect">
+                                <p:cTn id="17" presetID="42" presetClass="entr" presetSubtype="0" fill="hold" grpId="0" nodeType="clickEffect">
                                   <p:stCondLst>
                                     <p:cond delay="0"/>
                                   </p:stCondLst>
                                   <p:childTnLst>
                                     <p:set>
                                       <p:cBhvr>
-                                        <p:cTn id="13" dur="1" fill="hold">
+                                        <p:cTn id="18" dur="1" fill="hold">
                                           <p:stCondLst>
                                             <p:cond delay="0"/>
                                           </p:stCondLst>
@@ -12927,7 +13042,7 @@
                                     </p:set>
                                     <p:animEffect transition="in" filter="fade">
                                       <p:cBhvr>
-                                        <p:cTn id="14" dur="1000"/>
+                                        <p:cTn id="19" dur="1000"/>
                                         <p:tgtEl>
                                           <p:spTgt spid="3">
                                             <p:txEl>
@@ -12939,7 +13054,7 @@
                                     </p:animEffect>
                                     <p:anim calcmode="lin" valueType="num">
                                       <p:cBhvr>
-                                        <p:cTn id="15" dur="1000" fill="hold"/>
+                                        <p:cTn id="20" dur="1000" fill="hold"/>
                                         <p:tgtEl>
                                           <p:spTgt spid="3">
                                             <p:txEl>
@@ -12966,7 +13081,7 @@
                                     </p:anim>
                                     <p:anim calcmode="lin" valueType="num">
                                       <p:cBhvr>
-                                        <p:cTn id="16" dur="1000" fill="hold"/>
+                                        <p:cTn id="21" dur="1000" fill="hold"/>
                                         <p:tgtEl>
                                           <p:spTgt spid="3">
                                             <p:txEl>
@@ -12991,6 +13106,87 @@
                                         </p:tav>
                                       </p:tavLst>
                                     </p:anim>
+                                  </p:childTnLst>
+                                </p:cTn>
+                              </p:par>
+                              <p:par>
+                                <p:cTn id="22" presetID="53" presetClass="entr" presetSubtype="16" fill="hold" nodeType="withEffect">
+                                  <p:stCondLst>
+                                    <p:cond delay="0"/>
+                                  </p:stCondLst>
+                                  <p:childTnLst>
+                                    <p:set>
+                                      <p:cBhvr>
+                                        <p:cTn id="23" dur="1" fill="hold">
+                                          <p:stCondLst>
+                                            <p:cond delay="0"/>
+                                          </p:stCondLst>
+                                        </p:cTn>
+                                        <p:tgtEl>
+                                          <p:spTgt spid="14"/>
+                                        </p:tgtEl>
+                                        <p:attrNameLst>
+                                          <p:attrName>style.visibility</p:attrName>
+                                        </p:attrNameLst>
+                                      </p:cBhvr>
+                                      <p:to>
+                                        <p:strVal val="visible"/>
+                                      </p:to>
+                                    </p:set>
+                                    <p:anim calcmode="lin" valueType="num">
+                                      <p:cBhvr>
+                                        <p:cTn id="24" dur="900" fill="hold"/>
+                                        <p:tgtEl>
+                                          <p:spTgt spid="14"/>
+                                        </p:tgtEl>
+                                        <p:attrNameLst>
+                                          <p:attrName>ppt_w</p:attrName>
+                                        </p:attrNameLst>
+                                      </p:cBhvr>
+                                      <p:tavLst>
+                                        <p:tav tm="0">
+                                          <p:val>
+                                            <p:fltVal val="0"/>
+                                          </p:val>
+                                        </p:tav>
+                                        <p:tav tm="100000">
+                                          <p:val>
+                                            <p:strVal val="#ppt_w"/>
+                                          </p:val>
+                                        </p:tav>
+                                      </p:tavLst>
+                                    </p:anim>
+                                    <p:anim calcmode="lin" valueType="num">
+                                      <p:cBhvr>
+                                        <p:cTn id="25" dur="900" fill="hold"/>
+                                        <p:tgtEl>
+                                          <p:spTgt spid="14"/>
+                                        </p:tgtEl>
+                                        <p:attrNameLst>
+                                          <p:attrName>ppt_h</p:attrName>
+                                        </p:attrNameLst>
+                                      </p:cBhvr>
+                                      <p:tavLst>
+                                        <p:tav tm="0">
+                                          <p:val>
+                                            <p:fltVal val="0"/>
+                                          </p:val>
+                                        </p:tav>
+                                        <p:tav tm="100000">
+                                          <p:val>
+                                            <p:strVal val="#ppt_h"/>
+                                          </p:val>
+                                        </p:tav>
+                                      </p:tavLst>
+                                    </p:anim>
+                                    <p:animEffect transition="in" filter="fade">
+                                      <p:cBhvr>
+                                        <p:cTn id="26" dur="900"/>
+                                        <p:tgtEl>
+                                          <p:spTgt spid="14"/>
+                                        </p:tgtEl>
+                                      </p:cBhvr>
+                                    </p:animEffect>
                                   </p:childTnLst>
                                 </p:cTn>
                               </p:par>
@@ -13022,7 +13218,7 @@
       </p:par>
     </p:tnLst>
     <p:bldLst>
-      <p:bldP spid="3" grpId="0" build="p"/>
+      <p:bldP spid="3" grpId="0" uiExpand="1" build="p"/>
     </p:bldLst>
   </p:timing>
 </p:sld>
@@ -13812,16 +14008,17 @@
         </p:spPr>
         <p:txBody>
           <a:bodyPr>
-            <a:normAutofit/>
+            <a:noAutofit/>
           </a:bodyPr>
           <a:lstStyle/>
           <a:p>
+            <a:pPr algn="just"/>
             <a:r>
-              <a:rPr lang="it-IT" sz="1700" dirty="0"/>
+              <a:rPr lang="it-IT" dirty="0"/>
               <a:t>Un prodotto ORM fornisce, mediante un'</a:t>
             </a:r>
             <a:r>
-              <a:rPr lang="it-IT" sz="1700" dirty="0">
+              <a:rPr lang="it-IT" dirty="0">
                 <a:solidFill>
                   <a:srgbClr val="FFA33E"/>
                 </a:solidFill>
@@ -13829,17 +14026,18 @@
               <a:t>interfaccia orientata agli oggetti</a:t>
             </a:r>
             <a:r>
-              <a:rPr lang="it-IT" sz="1700" dirty="0"/>
+              <a:rPr lang="it-IT" dirty="0"/>
               <a:t>, tutti i servizi inerenti alla persistenza dei dati, astraendo nel contempo le caratteristiche implementative dello specifico RDBMS utilizzato.</a:t>
             </a:r>
           </a:p>
           <a:p>
+            <a:pPr algn="just"/>
             <a:r>
-              <a:rPr lang="it-IT" sz="1700" dirty="0"/>
+              <a:rPr lang="it-IT" dirty="0"/>
               <a:t>Questo permette il superamento dell’incompatibilità di fondo presente tra </a:t>
             </a:r>
             <a:r>
-              <a:rPr lang="it-IT" sz="1700" dirty="0">
+              <a:rPr lang="it-IT" dirty="0">
                 <a:solidFill>
                   <a:srgbClr val="FFA33E"/>
                 </a:solidFill>
@@ -13847,11 +14045,11 @@
               <a:t>un progetto orientato agli oggetti</a:t>
             </a:r>
             <a:r>
-              <a:rPr lang="it-IT" sz="1700" dirty="0"/>
+              <a:rPr lang="it-IT" dirty="0"/>
               <a:t> e il </a:t>
             </a:r>
             <a:r>
-              <a:rPr lang="it-IT" sz="1700" dirty="0">
+              <a:rPr lang="it-IT" dirty="0">
                 <a:solidFill>
                   <a:srgbClr val="FFA33E"/>
                 </a:solidFill>
@@ -13859,17 +14057,18 @@
               <a:t>modello relazionale</a:t>
             </a:r>
             <a:r>
-              <a:rPr lang="it-IT" sz="1700" dirty="0"/>
+              <a:rPr lang="it-IT" dirty="0"/>
               <a:t> sul quale è basato il nostro DBMS.</a:t>
             </a:r>
           </a:p>
           <a:p>
+            <a:pPr algn="just"/>
             <a:r>
-              <a:rPr lang="it-IT" sz="1700" dirty="0"/>
+              <a:rPr lang="it-IT" dirty="0"/>
               <a:t>Per gli sviluppatori questo si traduce in una </a:t>
             </a:r>
             <a:r>
-              <a:rPr lang="it-IT" sz="1700" dirty="0">
+              <a:rPr lang="it-IT" dirty="0">
                 <a:solidFill>
                   <a:srgbClr val="FFA33E"/>
                 </a:solidFill>
@@ -13877,11 +14076,11 @@
               <a:t>drastica riduzione della quantità di codice sorgente</a:t>
             </a:r>
             <a:r>
-              <a:rPr lang="it-IT" sz="1700" dirty="0"/>
+              <a:rPr lang="it-IT" dirty="0"/>
               <a:t> da redigere; l'ORM maschera dietro </a:t>
             </a:r>
             <a:r>
-              <a:rPr lang="it-IT" sz="1700" dirty="0">
+              <a:rPr lang="it-IT" dirty="0">
                 <a:solidFill>
                   <a:srgbClr val="FFA33E"/>
                 </a:solidFill>
@@ -13889,11 +14088,11 @@
               <a:t>semplici comandi </a:t>
             </a:r>
             <a:r>
-              <a:rPr lang="it-IT" sz="1700" dirty="0"/>
+              <a:rPr lang="it-IT" dirty="0"/>
               <a:t>le </a:t>
             </a:r>
             <a:r>
-              <a:rPr lang="it-IT" sz="1700" dirty="0">
+              <a:rPr lang="it-IT" dirty="0">
                 <a:solidFill>
                   <a:srgbClr val="FFA33E"/>
                 </a:solidFill>
@@ -13901,12 +14100,9 @@
               <a:t>complesse operazioni CRUD</a:t>
             </a:r>
             <a:r>
-              <a:rPr lang="it-IT" sz="1700" dirty="0"/>
-              <a:t>. Tali attività occupano di solito una buona percentuale del tempo di stesura, testing e manutenzione complessivo. Inoltre, sono per loro natura molto ripetitive e, dunque, favoriscono la possibilità che vengano commessi errori durante la stesura del codice che le implementa.</a:t>
+              <a:rPr lang="it-IT" dirty="0"/>
+              <a:t>. </a:t>
             </a:r>
-          </a:p>
-          <a:p>
-            <a:endParaRPr lang="it-IT" sz="1700" dirty="0"/>
           </a:p>
         </p:txBody>
       </p:sp>
@@ -15244,6 +15440,7 @@
           </a:bodyPr>
           <a:lstStyle/>
           <a:p>
+            <a:pPr algn="just"/>
             <a:r>
               <a:rPr lang="it-IT" sz="2400" dirty="0" err="1"/>
               <a:t>Hibernate</a:t>
@@ -15294,6 +15491,7 @@
             </a:r>
           </a:p>
           <a:p>
+            <a:pPr algn="just"/>
             <a:r>
               <a:rPr lang="it-IT" sz="2400" dirty="0"/>
               <a:t>Il mapping viene realizzato tramite </a:t>
@@ -15317,6 +15515,7 @@
             <a:endParaRPr lang="it-IT" sz="2400" dirty="0"/>
           </a:p>
           <a:p>
+            <a:pPr algn="just"/>
             <a:r>
               <a:rPr lang="it-IT" sz="2400" dirty="0"/>
               <a:t>Nel nostro caso risulta ideale in quanto permette la massima flessibilità e controllo sfruttando le tecnologie </a:t>
@@ -22084,6 +22283,14 @@
 <file path=ppt/slides/slide18.xml><?xml version="1.0" encoding="utf-8"?>
 <p:sld xmlns:a="http://schemas.openxmlformats.org/drawingml/2006/main" xmlns:r="http://schemas.openxmlformats.org/officeDocument/2006/relationships" xmlns:p="http://schemas.openxmlformats.org/presentationml/2006/main">
   <p:cSld>
+    <p:bg>
+      <p:bgPr>
+        <a:solidFill>
+          <a:schemeClr val="bg2"/>
+        </a:solidFill>
+        <a:effectLst/>
+      </p:bgPr>
+    </p:bg>
     <p:spTree>
       <p:nvGrpSpPr>
         <p:cNvPr id="1" name=""/>
@@ -22098,12 +22305,935 @@
           <a:chExt cx="0" cy="0"/>
         </a:xfrm>
       </p:grpSpPr>
+      <p:sp useBgFill="1">
+        <p:nvSpPr>
+          <p:cNvPr id="19" name="Background Fill">
+            <a:extLst>
+              <a:ext uri="{FF2B5EF4-FFF2-40B4-BE49-F238E27FC236}">
+                <a16:creationId xmlns:a16="http://schemas.microsoft.com/office/drawing/2014/main" id="{FAFB3478-4AEC-431E-93B2-1593839C16DA}"/>
+              </a:ext>
+              <a:ext uri="{C183D7F6-B498-43B3-948B-1728B52AA6E4}">
+                <adec:decorative xmlns:adec="http://schemas.microsoft.com/office/drawing/2017/decorative" val="1"/>
+              </a:ext>
+            </a:extLst>
+          </p:cNvPr>
+          <p:cNvSpPr>
+            <a:spLocks noGrp="1" noRot="1" noChangeAspect="1" noMove="1" noResize="1" noEditPoints="1" noAdjustHandles="1" noChangeArrowheads="1" noChangeShapeType="1" noTextEdit="1"/>
+          </p:cNvSpPr>
+          <p:nvPr>
+            <p:extLst>
+              <p:ext uri="{386F3935-93C4-4BCD-93E2-E3B085C9AB24}">
+                <p16:designElem xmlns:p16="http://schemas.microsoft.com/office/powerpoint/2015/main" val="1"/>
+              </p:ext>
+            </p:extLst>
+          </p:nvPr>
+        </p:nvSpPr>
+        <p:spPr>
+          <a:xfrm>
+            <a:off x="0" y="0"/>
+            <a:ext cx="12192000" cy="6858000"/>
+          </a:xfrm>
+          <a:prstGeom prst="rect">
+            <a:avLst/>
+          </a:prstGeom>
+          <a:ln w="9525" cap="flat">
+            <a:noFill/>
+            <a:prstDash val="solid"/>
+            <a:miter/>
+          </a:ln>
+        </p:spPr>
+        <p:txBody>
+          <a:bodyPr rtlCol="0" anchor="ctr"/>
+          <a:lstStyle/>
+          <a:p>
+            <a:endParaRPr lang="en-US">
+              <a:solidFill>
+                <a:schemeClr val="tx1"/>
+              </a:solidFill>
+            </a:endParaRPr>
+          </a:p>
+        </p:txBody>
+      </p:sp>
+      <p:sp>
+        <p:nvSpPr>
+          <p:cNvPr id="21" name="Color Fill">
+            <a:extLst>
+              <a:ext uri="{FF2B5EF4-FFF2-40B4-BE49-F238E27FC236}">
+                <a16:creationId xmlns:a16="http://schemas.microsoft.com/office/drawing/2014/main" id="{F74280F7-820D-43DE-BE07-57E20B27165C}"/>
+              </a:ext>
+              <a:ext uri="{C183D7F6-B498-43B3-948B-1728B52AA6E4}">
+                <adec:decorative xmlns:adec="http://schemas.microsoft.com/office/drawing/2017/decorative" val="1"/>
+              </a:ext>
+            </a:extLst>
+          </p:cNvPr>
+          <p:cNvSpPr>
+            <a:spLocks noGrp="1" noRot="1" noChangeAspect="1" noMove="1" noResize="1" noEditPoints="1" noAdjustHandles="1" noChangeArrowheads="1" noChangeShapeType="1" noTextEdit="1"/>
+          </p:cNvSpPr>
+          <p:nvPr>
+            <p:extLst>
+              <p:ext uri="{386F3935-93C4-4BCD-93E2-E3B085C9AB24}">
+                <p16:designElem xmlns:p16="http://schemas.microsoft.com/office/powerpoint/2015/main" val="1"/>
+              </p:ext>
+            </p:extLst>
+          </p:nvPr>
+        </p:nvSpPr>
+        <p:spPr>
+          <a:xfrm>
+            <a:off x="0" y="0"/>
+            <a:ext cx="12188952" cy="6858000"/>
+          </a:xfrm>
+          <a:prstGeom prst="rect">
+            <a:avLst/>
+          </a:prstGeom>
+          <a:solidFill>
+            <a:schemeClr val="bg2">
+              <a:lumMod val="75000"/>
+              <a:lumOff val="25000"/>
+              <a:alpha val="40000"/>
+            </a:schemeClr>
+          </a:solidFill>
+          <a:ln w="9525" cap="flat">
+            <a:noFill/>
+            <a:prstDash val="solid"/>
+            <a:miter/>
+          </a:ln>
+        </p:spPr>
+        <p:txBody>
+          <a:bodyPr rtlCol="0" anchor="ctr"/>
+          <a:lstStyle/>
+          <a:p>
+            <a:endParaRPr lang="en-US" dirty="0">
+              <a:solidFill>
+                <a:schemeClr val="bg2">
+                  <a:lumMod val="75000"/>
+                  <a:lumOff val="25000"/>
+                </a:schemeClr>
+              </a:solidFill>
+            </a:endParaRPr>
+          </a:p>
+        </p:txBody>
+      </p:sp>
+      <p:grpSp>
+        <p:nvGrpSpPr>
+          <p:cNvPr id="23" name="Group 22">
+            <a:extLst>
+              <a:ext uri="{FF2B5EF4-FFF2-40B4-BE49-F238E27FC236}">
+                <a16:creationId xmlns:a16="http://schemas.microsoft.com/office/drawing/2014/main" id="{CCD05CA9-900B-42D6-BF84-E51DF8B1503D}"/>
+              </a:ext>
+              <a:ext uri="{C183D7F6-B498-43B3-948B-1728B52AA6E4}">
+                <adec:decorative xmlns:adec="http://schemas.microsoft.com/office/drawing/2017/decorative" val="1"/>
+              </a:ext>
+            </a:extLst>
+          </p:cNvPr>
+          <p:cNvGrpSpPr>
+            <a:grpSpLocks noGrp="1" noUngrp="1" noRot="1" noChangeAspect="1" noMove="1" noResize="1"/>
+          </p:cNvGrpSpPr>
+          <p:nvPr>
+            <p:extLst>
+              <p:ext uri="{386F3935-93C4-4BCD-93E2-E3B085C9AB24}">
+                <p16:designElem xmlns:p16="http://schemas.microsoft.com/office/powerpoint/2015/main" val="1"/>
+              </p:ext>
+            </p:extLst>
+          </p:nvPr>
+        </p:nvGrpSpPr>
+        <p:grpSpPr>
+          <a:xfrm>
+            <a:off x="5448149" y="268616"/>
+            <a:ext cx="6745376" cy="6589384"/>
+            <a:chOff x="5448149" y="268616"/>
+            <a:chExt cx="6745376" cy="6589384"/>
+          </a:xfrm>
+        </p:grpSpPr>
+        <p:sp>
+          <p:nvSpPr>
+            <p:cNvPr id="24" name="Freeform: Shape 23">
+              <a:extLst>
+                <a:ext uri="{FF2B5EF4-FFF2-40B4-BE49-F238E27FC236}">
+                  <a16:creationId xmlns:a16="http://schemas.microsoft.com/office/drawing/2014/main" id="{493C6A70-C0B5-4908-A2EC-360597861C10}"/>
+                </a:ext>
+                <a:ext uri="{C183D7F6-B498-43B3-948B-1728B52AA6E4}">
+                  <adec:decorative xmlns:adec="http://schemas.microsoft.com/office/drawing/2017/decorative" val="1"/>
+                </a:ext>
+              </a:extLst>
+            </p:cNvPr>
+            <p:cNvSpPr/>
+            <p:nvPr>
+              <p:extLst>
+                <p:ext uri="{386F3935-93C4-4BCD-93E2-E3B085C9AB24}">
+                  <p16:designElem xmlns:p16="http://schemas.microsoft.com/office/powerpoint/2015/main" val="1"/>
+                </p:ext>
+              </p:extLst>
+            </p:nvPr>
+          </p:nvSpPr>
+          <p:spPr>
+            <a:xfrm>
+              <a:off x="9157348" y="4008649"/>
+              <a:ext cx="3036177" cy="2845954"/>
+            </a:xfrm>
+            <a:custGeom>
+              <a:avLst/>
+              <a:gdLst>
+                <a:gd name="connsiteX0" fmla="*/ 0 w 3036177"/>
+                <a:gd name="connsiteY0" fmla="*/ 0 h 2845954"/>
+                <a:gd name="connsiteX1" fmla="*/ 1515859 w 3036177"/>
+                <a:gd name="connsiteY1" fmla="*/ 0 h 2845954"/>
+                <a:gd name="connsiteX2" fmla="*/ 3036177 w 3036177"/>
+                <a:gd name="connsiteY2" fmla="*/ 1520319 h 2845954"/>
+                <a:gd name="connsiteX3" fmla="*/ 3036177 w 3036177"/>
+                <a:gd name="connsiteY3" fmla="*/ 2845954 h 2845954"/>
+                <a:gd name="connsiteX4" fmla="*/ 784560 w 3036177"/>
+                <a:gd name="connsiteY4" fmla="*/ 2845954 h 2845954"/>
+                <a:gd name="connsiteX5" fmla="*/ 670290 w 3036177"/>
+                <a:gd name="connsiteY5" fmla="*/ 2776534 h 2845954"/>
+                <a:gd name="connsiteX6" fmla="*/ 0 w 3036177"/>
+                <a:gd name="connsiteY6" fmla="*/ 1515859 h 2845954"/>
+              </a:gdLst>
+              <a:ahLst/>
+              <a:cxnLst>
+                <a:cxn ang="0">
+                  <a:pos x="connsiteX0" y="connsiteY0"/>
+                </a:cxn>
+                <a:cxn ang="0">
+                  <a:pos x="connsiteX1" y="connsiteY1"/>
+                </a:cxn>
+                <a:cxn ang="0">
+                  <a:pos x="connsiteX2" y="connsiteY2"/>
+                </a:cxn>
+                <a:cxn ang="0">
+                  <a:pos x="connsiteX3" y="connsiteY3"/>
+                </a:cxn>
+                <a:cxn ang="0">
+                  <a:pos x="connsiteX4" y="connsiteY4"/>
+                </a:cxn>
+                <a:cxn ang="0">
+                  <a:pos x="connsiteX5" y="connsiteY5"/>
+                </a:cxn>
+                <a:cxn ang="0">
+                  <a:pos x="connsiteX6" y="connsiteY6"/>
+                </a:cxn>
+              </a:cxnLst>
+              <a:rect l="l" t="t" r="r" b="b"/>
+              <a:pathLst>
+                <a:path w="3036177" h="2845954">
+                  <a:moveTo>
+                    <a:pt x="0" y="0"/>
+                  </a:moveTo>
+                  <a:lnTo>
+                    <a:pt x="1515859" y="0"/>
+                  </a:lnTo>
+                  <a:cubicBezTo>
+                    <a:pt x="2355517" y="0"/>
+                    <a:pt x="3036177" y="680661"/>
+                    <a:pt x="3036177" y="1520319"/>
+                  </a:cubicBezTo>
+                  <a:lnTo>
+                    <a:pt x="3036177" y="2845954"/>
+                  </a:lnTo>
+                  <a:lnTo>
+                    <a:pt x="784560" y="2845954"/>
+                  </a:lnTo>
+                  <a:lnTo>
+                    <a:pt x="670290" y="2776534"/>
+                  </a:lnTo>
+                  <a:cubicBezTo>
+                    <a:pt x="265883" y="2503323"/>
+                    <a:pt x="0" y="2040646"/>
+                    <a:pt x="0" y="1515859"/>
+                  </a:cubicBezTo>
+                  <a:close/>
+                </a:path>
+              </a:pathLst>
+            </a:custGeom>
+            <a:solidFill>
+              <a:schemeClr val="accent1">
+                <a:alpha val="60000"/>
+              </a:schemeClr>
+            </a:solidFill>
+            <a:ln w="9331" cap="flat">
+              <a:noFill/>
+              <a:prstDash val="solid"/>
+              <a:miter/>
+            </a:ln>
+          </p:spPr>
+          <p:txBody>
+            <a:bodyPr rtlCol="0" anchor="ctr"/>
+            <a:lstStyle/>
+            <a:p>
+              <a:endParaRPr lang="en-US" dirty="0"/>
+            </a:p>
+          </p:txBody>
+        </p:sp>
+        <p:sp>
+          <p:nvSpPr>
+            <p:cNvPr id="25" name="Oval 24">
+              <a:extLst>
+                <a:ext uri="{FF2B5EF4-FFF2-40B4-BE49-F238E27FC236}">
+                  <a16:creationId xmlns:a16="http://schemas.microsoft.com/office/drawing/2014/main" id="{C352B173-1F6F-43CE-815E-70C353832D46}"/>
+                </a:ext>
+                <a:ext uri="{C183D7F6-B498-43B3-948B-1728B52AA6E4}">
+                  <adec:decorative xmlns:adec="http://schemas.microsoft.com/office/drawing/2017/decorative" val="1"/>
+                </a:ext>
+              </a:extLst>
+            </p:cNvPr>
+            <p:cNvSpPr/>
+            <p:nvPr>
+              <p:extLst>
+                <p:ext uri="{386F3935-93C4-4BCD-93E2-E3B085C9AB24}">
+                  <p16:designElem xmlns:p16="http://schemas.microsoft.com/office/powerpoint/2015/main" val="1"/>
+                </p:ext>
+              </p:extLst>
+            </p:nvPr>
+          </p:nvSpPr>
+          <p:spPr>
+            <a:xfrm>
+              <a:off x="11464193" y="3584499"/>
+              <a:ext cx="491650" cy="491650"/>
+            </a:xfrm>
+            <a:prstGeom prst="ellipse">
+              <a:avLst/>
+            </a:prstGeom>
+            <a:solidFill>
+              <a:schemeClr val="accent2"/>
+            </a:solidFill>
+            <a:ln>
+              <a:noFill/>
+            </a:ln>
+          </p:spPr>
+          <p:style>
+            <a:lnRef idx="2">
+              <a:schemeClr val="accent1">
+                <a:shade val="50000"/>
+              </a:schemeClr>
+            </a:lnRef>
+            <a:fillRef idx="1">
+              <a:schemeClr val="accent1"/>
+            </a:fillRef>
+            <a:effectRef idx="0">
+              <a:schemeClr val="accent1"/>
+            </a:effectRef>
+            <a:fontRef idx="minor">
+              <a:schemeClr val="lt1"/>
+            </a:fontRef>
+          </p:style>
+          <p:txBody>
+            <a:bodyPr rtlCol="0" anchor="ctr"/>
+            <a:lstStyle/>
+            <a:p>
+              <a:pPr algn="ctr"/>
+              <a:endParaRPr lang="en-US"/>
+            </a:p>
+          </p:txBody>
+        </p:sp>
+        <p:sp>
+          <p:nvSpPr>
+            <p:cNvPr id="26" name="Oval 25">
+              <a:extLst>
+                <a:ext uri="{FF2B5EF4-FFF2-40B4-BE49-F238E27FC236}">
+                  <a16:creationId xmlns:a16="http://schemas.microsoft.com/office/drawing/2014/main" id="{364CD414-FEE4-4499-B5BE-2059603B97C3}"/>
+                </a:ext>
+                <a:ext uri="{C183D7F6-B498-43B3-948B-1728B52AA6E4}">
+                  <adec:decorative xmlns:adec="http://schemas.microsoft.com/office/drawing/2017/decorative" val="1"/>
+                </a:ext>
+              </a:extLst>
+            </p:cNvPr>
+            <p:cNvSpPr/>
+            <p:nvPr>
+              <p:extLst>
+                <p:ext uri="{386F3935-93C4-4BCD-93E2-E3B085C9AB24}">
+                  <p16:designElem xmlns:p16="http://schemas.microsoft.com/office/powerpoint/2015/main" val="1"/>
+                </p:ext>
+              </p:extLst>
+            </p:nvPr>
+          </p:nvSpPr>
+          <p:spPr>
+            <a:xfrm>
+              <a:off x="9745458" y="623464"/>
+              <a:ext cx="273097" cy="273097"/>
+            </a:xfrm>
+            <a:prstGeom prst="ellipse">
+              <a:avLst/>
+            </a:prstGeom>
+            <a:solidFill>
+              <a:schemeClr val="accent1">
+                <a:lumMod val="60000"/>
+                <a:lumOff val="40000"/>
+              </a:schemeClr>
+            </a:solidFill>
+            <a:ln w="9331" cap="flat">
+              <a:noFill/>
+              <a:prstDash val="solid"/>
+              <a:miter/>
+            </a:ln>
+          </p:spPr>
+          <p:txBody>
+            <a:bodyPr rtlCol="0" anchor="ctr"/>
+            <a:lstStyle/>
+            <a:p>
+              <a:endParaRPr lang="en-US">
+                <a:solidFill>
+                  <a:schemeClr val="tx1"/>
+                </a:solidFill>
+              </a:endParaRPr>
+            </a:p>
+          </p:txBody>
+        </p:sp>
+        <p:sp>
+          <p:nvSpPr>
+            <p:cNvPr id="27" name="Graphic 9">
+              <a:extLst>
+                <a:ext uri="{FF2B5EF4-FFF2-40B4-BE49-F238E27FC236}">
+                  <a16:creationId xmlns:a16="http://schemas.microsoft.com/office/drawing/2014/main" id="{0CD3B3FE-DC8C-4D16-9594-053C2BA4BF49}"/>
+                </a:ext>
+                <a:ext uri="{C183D7F6-B498-43B3-948B-1728B52AA6E4}">
+                  <adec:decorative xmlns:adec="http://schemas.microsoft.com/office/drawing/2017/decorative" val="1"/>
+                </a:ext>
+              </a:extLst>
+            </p:cNvPr>
+            <p:cNvSpPr/>
+            <p:nvPr>
+              <p:extLst>
+                <p:ext uri="{386F3935-93C4-4BCD-93E2-E3B085C9AB24}">
+                  <p16:designElem xmlns:p16="http://schemas.microsoft.com/office/powerpoint/2015/main" val="1"/>
+                </p:ext>
+              </p:extLst>
+            </p:nvPr>
+          </p:nvSpPr>
+          <p:spPr>
+            <a:xfrm>
+              <a:off x="9363379" y="4177495"/>
+              <a:ext cx="2610483" cy="2680505"/>
+            </a:xfrm>
+            <a:custGeom>
+              <a:avLst/>
+              <a:gdLst>
+                <a:gd name="connsiteX0" fmla="*/ 6861546 w 6861545"/>
+                <a:gd name="connsiteY0" fmla="*/ 6861546 h 6861545"/>
+                <a:gd name="connsiteX1" fmla="*/ 3435812 w 6861545"/>
+                <a:gd name="connsiteY1" fmla="*/ 6861546 h 6861545"/>
+                <a:gd name="connsiteX2" fmla="*/ 0 w 6861545"/>
+                <a:gd name="connsiteY2" fmla="*/ 3425734 h 6861545"/>
+                <a:gd name="connsiteX3" fmla="*/ 0 w 6861545"/>
+                <a:gd name="connsiteY3" fmla="*/ 0 h 6861545"/>
+                <a:gd name="connsiteX4" fmla="*/ 3425734 w 6861545"/>
+                <a:gd name="connsiteY4" fmla="*/ 0 h 6861545"/>
+                <a:gd name="connsiteX5" fmla="*/ 6861546 w 6861545"/>
+                <a:gd name="connsiteY5" fmla="*/ 3435812 h 6861545"/>
+                <a:gd name="connsiteX6" fmla="*/ 6861546 w 6861545"/>
+                <a:gd name="connsiteY6" fmla="*/ 6861546 h 6861545"/>
+              </a:gdLst>
+              <a:ahLst/>
+              <a:cxnLst>
+                <a:cxn ang="0">
+                  <a:pos x="connsiteX0" y="connsiteY0"/>
+                </a:cxn>
+                <a:cxn ang="0">
+                  <a:pos x="connsiteX1" y="connsiteY1"/>
+                </a:cxn>
+                <a:cxn ang="0">
+                  <a:pos x="connsiteX2" y="connsiteY2"/>
+                </a:cxn>
+                <a:cxn ang="0">
+                  <a:pos x="connsiteX3" y="connsiteY3"/>
+                </a:cxn>
+                <a:cxn ang="0">
+                  <a:pos x="connsiteX4" y="connsiteY4"/>
+                </a:cxn>
+                <a:cxn ang="0">
+                  <a:pos x="connsiteX5" y="connsiteY5"/>
+                </a:cxn>
+                <a:cxn ang="0">
+                  <a:pos x="connsiteX6" y="connsiteY6"/>
+                </a:cxn>
+              </a:cxnLst>
+              <a:rect l="l" t="t" r="r" b="b"/>
+              <a:pathLst>
+                <a:path w="6861545" h="6861545">
+                  <a:moveTo>
+                    <a:pt x="6861546" y="6861546"/>
+                  </a:moveTo>
+                  <a:lnTo>
+                    <a:pt x="3435812" y="6861546"/>
+                  </a:lnTo>
+                  <a:cubicBezTo>
+                    <a:pt x="1538245" y="6861546"/>
+                    <a:pt x="0" y="5323301"/>
+                    <a:pt x="0" y="3425734"/>
+                  </a:cubicBezTo>
+                  <a:lnTo>
+                    <a:pt x="0" y="0"/>
+                  </a:lnTo>
+                  <a:lnTo>
+                    <a:pt x="3425734" y="0"/>
+                  </a:lnTo>
+                  <a:cubicBezTo>
+                    <a:pt x="5323301" y="0"/>
+                    <a:pt x="6861546" y="1538245"/>
+                    <a:pt x="6861546" y="3435812"/>
+                  </a:cubicBezTo>
+                  <a:lnTo>
+                    <a:pt x="6861546" y="6861546"/>
+                  </a:lnTo>
+                  <a:close/>
+                </a:path>
+              </a:pathLst>
+            </a:custGeom>
+            <a:pattFill prst="pct5">
+              <a:fgClr>
+                <a:schemeClr val="accent4">
+                  <a:lumMod val="60000"/>
+                  <a:lumOff val="40000"/>
+                </a:schemeClr>
+              </a:fgClr>
+              <a:bgClr>
+                <a:schemeClr val="accent1">
+                  <a:lumMod val="75000"/>
+                </a:schemeClr>
+              </a:bgClr>
+            </a:pattFill>
+            <a:ln w="9525" cap="flat">
+              <a:noFill/>
+              <a:prstDash val="solid"/>
+              <a:miter/>
+            </a:ln>
+          </p:spPr>
+          <p:txBody>
+            <a:bodyPr rtlCol="0" anchor="ctr"/>
+            <a:lstStyle/>
+            <a:p>
+              <a:endParaRPr lang="en-US" dirty="0"/>
+            </a:p>
+          </p:txBody>
+        </p:sp>
+        <p:sp>
+          <p:nvSpPr>
+            <p:cNvPr id="28" name="Graphic 9">
+              <a:extLst>
+                <a:ext uri="{FF2B5EF4-FFF2-40B4-BE49-F238E27FC236}">
+                  <a16:creationId xmlns:a16="http://schemas.microsoft.com/office/drawing/2014/main" id="{C9E59506-9F0B-4E2E-A3D6-0F61DA19B3FE}"/>
+                </a:ext>
+                <a:ext uri="{C183D7F6-B498-43B3-948B-1728B52AA6E4}">
+                  <adec:decorative xmlns:adec="http://schemas.microsoft.com/office/drawing/2017/decorative" val="1"/>
+                </a:ext>
+              </a:extLst>
+            </p:cNvPr>
+            <p:cNvSpPr/>
+            <p:nvPr>
+              <p:extLst>
+                <p:ext uri="{386F3935-93C4-4BCD-93E2-E3B085C9AB24}">
+                  <p16:designElem xmlns:p16="http://schemas.microsoft.com/office/powerpoint/2015/main" val="1"/>
+                </p:ext>
+              </p:extLst>
+            </p:nvPr>
+          </p:nvSpPr>
+          <p:spPr>
+            <a:xfrm>
+              <a:off x="5448149" y="268616"/>
+              <a:ext cx="3550966" cy="3550966"/>
+            </a:xfrm>
+            <a:custGeom>
+              <a:avLst/>
+              <a:gdLst>
+                <a:gd name="connsiteX0" fmla="*/ 6861546 w 6861545"/>
+                <a:gd name="connsiteY0" fmla="*/ 6861546 h 6861545"/>
+                <a:gd name="connsiteX1" fmla="*/ 3435812 w 6861545"/>
+                <a:gd name="connsiteY1" fmla="*/ 6861546 h 6861545"/>
+                <a:gd name="connsiteX2" fmla="*/ 0 w 6861545"/>
+                <a:gd name="connsiteY2" fmla="*/ 3425734 h 6861545"/>
+                <a:gd name="connsiteX3" fmla="*/ 0 w 6861545"/>
+                <a:gd name="connsiteY3" fmla="*/ 0 h 6861545"/>
+                <a:gd name="connsiteX4" fmla="*/ 3425734 w 6861545"/>
+                <a:gd name="connsiteY4" fmla="*/ 0 h 6861545"/>
+                <a:gd name="connsiteX5" fmla="*/ 6861546 w 6861545"/>
+                <a:gd name="connsiteY5" fmla="*/ 3435812 h 6861545"/>
+                <a:gd name="connsiteX6" fmla="*/ 6861546 w 6861545"/>
+                <a:gd name="connsiteY6" fmla="*/ 6861546 h 6861545"/>
+              </a:gdLst>
+              <a:ahLst/>
+              <a:cxnLst>
+                <a:cxn ang="0">
+                  <a:pos x="connsiteX0" y="connsiteY0"/>
+                </a:cxn>
+                <a:cxn ang="0">
+                  <a:pos x="connsiteX1" y="connsiteY1"/>
+                </a:cxn>
+                <a:cxn ang="0">
+                  <a:pos x="connsiteX2" y="connsiteY2"/>
+                </a:cxn>
+                <a:cxn ang="0">
+                  <a:pos x="connsiteX3" y="connsiteY3"/>
+                </a:cxn>
+                <a:cxn ang="0">
+                  <a:pos x="connsiteX4" y="connsiteY4"/>
+                </a:cxn>
+                <a:cxn ang="0">
+                  <a:pos x="connsiteX5" y="connsiteY5"/>
+                </a:cxn>
+                <a:cxn ang="0">
+                  <a:pos x="connsiteX6" y="connsiteY6"/>
+                </a:cxn>
+              </a:cxnLst>
+              <a:rect l="l" t="t" r="r" b="b"/>
+              <a:pathLst>
+                <a:path w="6861545" h="6861545">
+                  <a:moveTo>
+                    <a:pt x="6861546" y="6861546"/>
+                  </a:moveTo>
+                  <a:lnTo>
+                    <a:pt x="3435812" y="6861546"/>
+                  </a:lnTo>
+                  <a:cubicBezTo>
+                    <a:pt x="1538245" y="6861546"/>
+                    <a:pt x="0" y="5323301"/>
+                    <a:pt x="0" y="3425734"/>
+                  </a:cubicBezTo>
+                  <a:lnTo>
+                    <a:pt x="0" y="0"/>
+                  </a:lnTo>
+                  <a:lnTo>
+                    <a:pt x="3425734" y="0"/>
+                  </a:lnTo>
+                  <a:cubicBezTo>
+                    <a:pt x="5323301" y="0"/>
+                    <a:pt x="6861546" y="1538245"/>
+                    <a:pt x="6861546" y="3435812"/>
+                  </a:cubicBezTo>
+                  <a:lnTo>
+                    <a:pt x="6861546" y="6861546"/>
+                  </a:lnTo>
+                  <a:close/>
+                </a:path>
+              </a:pathLst>
+            </a:custGeom>
+            <a:solidFill>
+              <a:srgbClr val="E0FF59"/>
+            </a:solidFill>
+            <a:ln w="38100" cap="flat">
+              <a:solidFill>
+                <a:srgbClr val="F7F7F7"/>
+              </a:solidFill>
+              <a:prstDash val="solid"/>
+              <a:miter/>
+            </a:ln>
+          </p:spPr>
+          <p:txBody>
+            <a:bodyPr rtlCol="0" anchor="ctr"/>
+            <a:lstStyle/>
+            <a:p>
+              <a:endParaRPr lang="en-US"/>
+            </a:p>
+          </p:txBody>
+        </p:sp>
+        <p:sp>
+          <p:nvSpPr>
+            <p:cNvPr id="29" name="Graphic 9">
+              <a:extLst>
+                <a:ext uri="{FF2B5EF4-FFF2-40B4-BE49-F238E27FC236}">
+                  <a16:creationId xmlns:a16="http://schemas.microsoft.com/office/drawing/2014/main" id="{731E1CFF-910A-4EB6-B58C-B8095FD4BCE6}"/>
+                </a:ext>
+                <a:ext uri="{C183D7F6-B498-43B3-948B-1728B52AA6E4}">
+                  <adec:decorative xmlns:adec="http://schemas.microsoft.com/office/drawing/2017/decorative" val="1"/>
+                </a:ext>
+              </a:extLst>
+            </p:cNvPr>
+            <p:cNvSpPr/>
+            <p:nvPr>
+              <p:extLst>
+                <p:ext uri="{386F3935-93C4-4BCD-93E2-E3B085C9AB24}">
+                  <p16:designElem xmlns:p16="http://schemas.microsoft.com/office/powerpoint/2015/main" val="1"/>
+                </p:ext>
+              </p:extLst>
+            </p:nvPr>
+          </p:nvSpPr>
+          <p:spPr>
+            <a:xfrm rot="16200000">
+              <a:off x="9191424" y="1182612"/>
+              <a:ext cx="2654364" cy="2654364"/>
+            </a:xfrm>
+            <a:custGeom>
+              <a:avLst/>
+              <a:gdLst>
+                <a:gd name="connsiteX0" fmla="*/ 6861546 w 6861545"/>
+                <a:gd name="connsiteY0" fmla="*/ 6861546 h 6861545"/>
+                <a:gd name="connsiteX1" fmla="*/ 3435812 w 6861545"/>
+                <a:gd name="connsiteY1" fmla="*/ 6861546 h 6861545"/>
+                <a:gd name="connsiteX2" fmla="*/ 0 w 6861545"/>
+                <a:gd name="connsiteY2" fmla="*/ 3425734 h 6861545"/>
+                <a:gd name="connsiteX3" fmla="*/ 0 w 6861545"/>
+                <a:gd name="connsiteY3" fmla="*/ 0 h 6861545"/>
+                <a:gd name="connsiteX4" fmla="*/ 3425734 w 6861545"/>
+                <a:gd name="connsiteY4" fmla="*/ 0 h 6861545"/>
+                <a:gd name="connsiteX5" fmla="*/ 6861546 w 6861545"/>
+                <a:gd name="connsiteY5" fmla="*/ 3435812 h 6861545"/>
+                <a:gd name="connsiteX6" fmla="*/ 6861546 w 6861545"/>
+                <a:gd name="connsiteY6" fmla="*/ 6861546 h 6861545"/>
+              </a:gdLst>
+              <a:ahLst/>
+              <a:cxnLst>
+                <a:cxn ang="0">
+                  <a:pos x="connsiteX0" y="connsiteY0"/>
+                </a:cxn>
+                <a:cxn ang="0">
+                  <a:pos x="connsiteX1" y="connsiteY1"/>
+                </a:cxn>
+                <a:cxn ang="0">
+                  <a:pos x="connsiteX2" y="connsiteY2"/>
+                </a:cxn>
+                <a:cxn ang="0">
+                  <a:pos x="connsiteX3" y="connsiteY3"/>
+                </a:cxn>
+                <a:cxn ang="0">
+                  <a:pos x="connsiteX4" y="connsiteY4"/>
+                </a:cxn>
+                <a:cxn ang="0">
+                  <a:pos x="connsiteX5" y="connsiteY5"/>
+                </a:cxn>
+                <a:cxn ang="0">
+                  <a:pos x="connsiteX6" y="connsiteY6"/>
+                </a:cxn>
+              </a:cxnLst>
+              <a:rect l="l" t="t" r="r" b="b"/>
+              <a:pathLst>
+                <a:path w="6861545" h="6861545">
+                  <a:moveTo>
+                    <a:pt x="6861546" y="6861546"/>
+                  </a:moveTo>
+                  <a:lnTo>
+                    <a:pt x="3435812" y="6861546"/>
+                  </a:lnTo>
+                  <a:cubicBezTo>
+                    <a:pt x="1538245" y="6861546"/>
+                    <a:pt x="0" y="5323301"/>
+                    <a:pt x="0" y="3425734"/>
+                  </a:cubicBezTo>
+                  <a:lnTo>
+                    <a:pt x="0" y="0"/>
+                  </a:lnTo>
+                  <a:lnTo>
+                    <a:pt x="3425734" y="0"/>
+                  </a:lnTo>
+                  <a:cubicBezTo>
+                    <a:pt x="5323301" y="0"/>
+                    <a:pt x="6861546" y="1538245"/>
+                    <a:pt x="6861546" y="3435812"/>
+                  </a:cubicBezTo>
+                  <a:lnTo>
+                    <a:pt x="6861546" y="6861546"/>
+                  </a:lnTo>
+                  <a:close/>
+                </a:path>
+              </a:pathLst>
+            </a:custGeom>
+            <a:solidFill>
+              <a:srgbClr val="269E83"/>
+            </a:solidFill>
+            <a:ln w="38100" cap="flat">
+              <a:solidFill>
+                <a:srgbClr val="E0FF59"/>
+              </a:solidFill>
+              <a:prstDash val="solid"/>
+              <a:miter/>
+            </a:ln>
+          </p:spPr>
+          <p:txBody>
+            <a:bodyPr rtlCol="0" anchor="ctr"/>
+            <a:lstStyle/>
+            <a:p>
+              <a:endParaRPr lang="en-US">
+                <a:solidFill>
+                  <a:srgbClr val="269E83"/>
+                </a:solidFill>
+              </a:endParaRPr>
+            </a:p>
+          </p:txBody>
+        </p:sp>
+        <p:sp>
+          <p:nvSpPr>
+            <p:cNvPr id="30" name="Freeform: Shape 29">
+              <a:extLst>
+                <a:ext uri="{FF2B5EF4-FFF2-40B4-BE49-F238E27FC236}">
+                  <a16:creationId xmlns:a16="http://schemas.microsoft.com/office/drawing/2014/main" id="{DEA4E8B6-F203-4AF8-986F-F244DFF08667}"/>
+                </a:ext>
+                <a:ext uri="{C183D7F6-B498-43B3-948B-1728B52AA6E4}">
+                  <adec:decorative xmlns:adec="http://schemas.microsoft.com/office/drawing/2017/decorative" val="1"/>
+                </a:ext>
+              </a:extLst>
+            </p:cNvPr>
+            <p:cNvSpPr/>
+            <p:nvPr>
+              <p:extLst>
+                <p:ext uri="{386F3935-93C4-4BCD-93E2-E3B085C9AB24}">
+                  <p16:designElem xmlns:p16="http://schemas.microsoft.com/office/powerpoint/2015/main" val="1"/>
+                </p:ext>
+              </p:extLst>
+            </p:nvPr>
+          </p:nvSpPr>
+          <p:spPr>
+            <a:xfrm rot="5400000">
+              <a:off x="5839908" y="3680866"/>
+              <a:ext cx="2863752" cy="3454661"/>
+            </a:xfrm>
+            <a:custGeom>
+              <a:avLst/>
+              <a:gdLst>
+                <a:gd name="connsiteX0" fmla="*/ 0 w 2926519"/>
+                <a:gd name="connsiteY0" fmla="*/ 1772876 h 3550967"/>
+                <a:gd name="connsiteX1" fmla="*/ 0 w 2926519"/>
+                <a:gd name="connsiteY1" fmla="*/ 0 h 3550967"/>
+                <a:gd name="connsiteX2" fmla="*/ 1772876 w 2926519"/>
+                <a:gd name="connsiteY2" fmla="*/ 0 h 3550967"/>
+                <a:gd name="connsiteX3" fmla="*/ 2903911 w 2926519"/>
+                <a:gd name="connsiteY3" fmla="*/ 406026 h 3550967"/>
+                <a:gd name="connsiteX4" fmla="*/ 2926519 w 2926519"/>
+                <a:gd name="connsiteY4" fmla="*/ 426574 h 3550967"/>
+                <a:gd name="connsiteX5" fmla="*/ 2926519 w 2926519"/>
+                <a:gd name="connsiteY5" fmla="*/ 3550967 h 3550967"/>
+                <a:gd name="connsiteX6" fmla="*/ 1778091 w 2926519"/>
+                <a:gd name="connsiteY6" fmla="*/ 3550967 h 3550967"/>
+                <a:gd name="connsiteX7" fmla="*/ 0 w 2926519"/>
+                <a:gd name="connsiteY7" fmla="*/ 1772876 h 3550967"/>
+              </a:gdLst>
+              <a:ahLst/>
+              <a:cxnLst>
+                <a:cxn ang="0">
+                  <a:pos x="connsiteX0" y="connsiteY0"/>
+                </a:cxn>
+                <a:cxn ang="0">
+                  <a:pos x="connsiteX1" y="connsiteY1"/>
+                </a:cxn>
+                <a:cxn ang="0">
+                  <a:pos x="connsiteX2" y="connsiteY2"/>
+                </a:cxn>
+                <a:cxn ang="0">
+                  <a:pos x="connsiteX3" y="connsiteY3"/>
+                </a:cxn>
+                <a:cxn ang="0">
+                  <a:pos x="connsiteX4" y="connsiteY4"/>
+                </a:cxn>
+                <a:cxn ang="0">
+                  <a:pos x="connsiteX5" y="connsiteY5"/>
+                </a:cxn>
+                <a:cxn ang="0">
+                  <a:pos x="connsiteX6" y="connsiteY6"/>
+                </a:cxn>
+                <a:cxn ang="0">
+                  <a:pos x="connsiteX7" y="connsiteY7"/>
+                </a:cxn>
+              </a:cxnLst>
+              <a:rect l="l" t="t" r="r" b="b"/>
+              <a:pathLst>
+                <a:path w="2926519" h="3550967">
+                  <a:moveTo>
+                    <a:pt x="0" y="1772876"/>
+                  </a:moveTo>
+                  <a:lnTo>
+                    <a:pt x="0" y="0"/>
+                  </a:lnTo>
+                  <a:lnTo>
+                    <a:pt x="1772876" y="0"/>
+                  </a:lnTo>
+                  <a:cubicBezTo>
+                    <a:pt x="2202511" y="0"/>
+                    <a:pt x="2596553" y="152372"/>
+                    <a:pt x="2903911" y="406026"/>
+                  </a:cubicBezTo>
+                  <a:lnTo>
+                    <a:pt x="2926519" y="426574"/>
+                  </a:lnTo>
+                  <a:lnTo>
+                    <a:pt x="2926519" y="3550967"/>
+                  </a:lnTo>
+                  <a:lnTo>
+                    <a:pt x="1778091" y="3550967"/>
+                  </a:lnTo>
+                  <a:cubicBezTo>
+                    <a:pt x="796068" y="3550967"/>
+                    <a:pt x="0" y="2754899"/>
+                    <a:pt x="0" y="1772876"/>
+                  </a:cubicBezTo>
+                  <a:close/>
+                </a:path>
+              </a:pathLst>
+            </a:custGeom>
+            <a:solidFill>
+              <a:srgbClr val="FFFFFF"/>
+            </a:solidFill>
+            <a:ln w="38100" cap="flat">
+              <a:solidFill>
+                <a:srgbClr val="FFA33E"/>
+              </a:solidFill>
+              <a:prstDash val="solid"/>
+              <a:miter/>
+            </a:ln>
+          </p:spPr>
+          <p:txBody>
+            <a:bodyPr wrap="square" rtlCol="0" anchor="ctr">
+              <a:noAutofit/>
+            </a:bodyPr>
+            <a:lstStyle/>
+            <a:p>
+              <a:endParaRPr lang="en-US" dirty="0"/>
+            </a:p>
+          </p:txBody>
+        </p:sp>
+      </p:grpSp>
+      <p:sp>
+        <p:nvSpPr>
+          <p:cNvPr id="32" name="Texture">
+            <a:extLst>
+              <a:ext uri="{FF2B5EF4-FFF2-40B4-BE49-F238E27FC236}">
+                <a16:creationId xmlns:a16="http://schemas.microsoft.com/office/drawing/2014/main" id="{2E922E9E-A29B-4164-A634-B718A43369CA}"/>
+              </a:ext>
+              <a:ext uri="{C183D7F6-B498-43B3-948B-1728B52AA6E4}">
+                <adec:decorative xmlns:adec="http://schemas.microsoft.com/office/drawing/2017/decorative" val="1"/>
+              </a:ext>
+            </a:extLst>
+          </p:cNvPr>
+          <p:cNvSpPr>
+            <a:spLocks noGrp="1" noRot="1" noChangeAspect="1" noMove="1" noResize="1" noEditPoints="1" noAdjustHandles="1" noChangeArrowheads="1" noChangeShapeType="1" noTextEdit="1"/>
+          </p:cNvSpPr>
+          <p:nvPr>
+            <p:extLst>
+              <p:ext uri="{386F3935-93C4-4BCD-93E2-E3B085C9AB24}">
+                <p16:designElem xmlns:p16="http://schemas.microsoft.com/office/powerpoint/2015/main" val="1"/>
+              </p:ext>
+            </p:extLst>
+          </p:nvPr>
+        </p:nvSpPr>
+        <p:spPr>
+          <a:xfrm>
+            <a:off x="3048" y="0"/>
+            <a:ext cx="12188952" cy="6858000"/>
+          </a:xfrm>
+          <a:prstGeom prst="rect">
+            <a:avLst/>
+          </a:prstGeom>
+          <a:blipFill dpi="0" rotWithShape="1">
+            <a:blip r:embed="rId2">
+              <a:alphaModFix amt="6000"/>
+            </a:blip>
+            <a:srcRect/>
+            <a:tile tx="0" ty="0" sx="100000" sy="100000" flip="none" algn="tl"/>
+          </a:blipFill>
+          <a:ln w="9525" cap="flat">
+            <a:noFill/>
+            <a:prstDash val="solid"/>
+            <a:miter/>
+          </a:ln>
+        </p:spPr>
+        <p:txBody>
+          <a:bodyPr rtlCol="0" anchor="ctr"/>
+          <a:lstStyle/>
+          <a:p>
+            <a:endParaRPr lang="en-US" dirty="0"/>
+          </a:p>
+        </p:txBody>
+      </p:sp>
       <p:sp>
         <p:nvSpPr>
           <p:cNvPr id="2" name="Titolo 1">
             <a:extLst>
               <a:ext uri="{FF2B5EF4-FFF2-40B4-BE49-F238E27FC236}">
-                <a16:creationId xmlns:a16="http://schemas.microsoft.com/office/drawing/2014/main" id="{C069ECAF-7FB7-3640-EDE6-2A9AE74B1723}"/>
+                <a16:creationId xmlns:a16="http://schemas.microsoft.com/office/drawing/2014/main" id="{4061ACB0-5B00-8686-9F96-71848F8C4875}"/>
               </a:ext>
             </a:extLst>
           </p:cNvPr>
@@ -22114,9 +23244,16 @@
             <p:ph type="title"/>
           </p:nvPr>
         </p:nvSpPr>
-        <p:spPr/>
+        <p:spPr>
+          <a:xfrm>
+            <a:off x="457201" y="758952"/>
+            <a:ext cx="4876800" cy="1325563"/>
+          </a:xfrm>
+        </p:spPr>
         <p:txBody>
-          <a:bodyPr/>
+          <a:bodyPr anchor="b">
+            <a:normAutofit/>
+          </a:bodyPr>
           <a:lstStyle/>
           <a:p>
             <a:r>
@@ -22127,6 +23264,7 @@
               </a:rPr>
               <a:t>Altre modifiche al progetto</a:t>
             </a:r>
+            <a:endParaRPr lang="it-IT" dirty="0"/>
           </a:p>
         </p:txBody>
       </p:sp>
@@ -22135,7 +23273,7 @@
           <p:cNvPr id="3" name="Segnaposto contenuto 2">
             <a:extLst>
               <a:ext uri="{FF2B5EF4-FFF2-40B4-BE49-F238E27FC236}">
-                <a16:creationId xmlns:a16="http://schemas.microsoft.com/office/drawing/2014/main" id="{100DD949-0988-DADF-4121-EB739B176A74}"/>
+                <a16:creationId xmlns:a16="http://schemas.microsoft.com/office/drawing/2014/main" id="{B887D01B-EBEC-D1F4-AB45-A54E8394AEA2}"/>
               </a:ext>
             </a:extLst>
           </p:cNvPr>
@@ -22146,21 +23284,224 @@
             <p:ph idx="1"/>
           </p:nvPr>
         </p:nvSpPr>
-        <p:spPr/>
+        <p:spPr>
+          <a:xfrm>
+            <a:off x="457201" y="2286001"/>
+            <a:ext cx="4876800" cy="3878710"/>
+          </a:xfrm>
+        </p:spPr>
         <p:txBody>
-          <a:bodyPr/>
+          <a:bodyPr>
+            <a:normAutofit/>
+          </a:bodyPr>
           <a:lstStyle/>
+          <a:p>
+            <a:pPr algn="just"/>
+            <a:r>
+              <a:rPr lang="it-IT" dirty="0"/>
+              <a:t>Abbiamo apportato altre modifiche minori al progetto, quali:</a:t>
+            </a:r>
+          </a:p>
+          <a:p>
+            <a:pPr lvl="1" algn="just"/>
+            <a:r>
+              <a:rPr lang="it-IT" dirty="0"/>
+              <a:t>Cambiare il </a:t>
+            </a:r>
+            <a:r>
+              <a:rPr lang="it-IT" dirty="0">
+                <a:solidFill>
+                  <a:srgbClr val="FFA33E"/>
+                </a:solidFill>
+              </a:rPr>
+              <a:t>parametro ‘‘paziente’’ </a:t>
+            </a:r>
+            <a:r>
+              <a:rPr lang="it-IT" dirty="0"/>
+              <a:t>dell’appuntamento in una </a:t>
+            </a:r>
+            <a:r>
+              <a:rPr lang="it-IT" dirty="0">
+                <a:solidFill>
+                  <a:srgbClr val="FFA33E"/>
+                </a:solidFill>
+              </a:rPr>
+              <a:t>stringa</a:t>
+            </a:r>
+            <a:r>
+              <a:rPr lang="it-IT" dirty="0"/>
+              <a:t>. In questo modo la vista è più </a:t>
+            </a:r>
+            <a:r>
+              <a:rPr lang="it-IT" dirty="0">
+                <a:solidFill>
+                  <a:srgbClr val="FFA33E"/>
+                </a:solidFill>
+              </a:rPr>
+              <a:t>semplice</a:t>
+            </a:r>
+            <a:r>
+              <a:rPr lang="it-IT" dirty="0"/>
+              <a:t> da realizzare </a:t>
+            </a:r>
+          </a:p>
+          <a:p>
+            <a:pPr lvl="1" algn="just"/>
+            <a:r>
+              <a:rPr lang="it-IT" dirty="0"/>
+              <a:t>Aggiungere alcuni </a:t>
+            </a:r>
+            <a:r>
+              <a:rPr lang="it-IT" dirty="0">
+                <a:solidFill>
+                  <a:srgbClr val="FFA33E"/>
+                </a:solidFill>
+              </a:rPr>
+              <a:t>metodi di calcolo </a:t>
+            </a:r>
+            <a:r>
+              <a:rPr lang="it-IT" dirty="0"/>
+              <a:t>dei valori all’interno del </a:t>
+            </a:r>
+            <a:r>
+              <a:rPr lang="it-IT" dirty="0">
+                <a:solidFill>
+                  <a:srgbClr val="FFA33E"/>
+                </a:solidFill>
+              </a:rPr>
+              <a:t>model</a:t>
+            </a:r>
+          </a:p>
           <a:p>
             <a:endParaRPr lang="it-IT" dirty="0"/>
           </a:p>
         </p:txBody>
       </p:sp>
+      <p:sp>
+        <p:nvSpPr>
+          <p:cNvPr id="31" name="Graphic 9">
+            <a:extLst>
+              <a:ext uri="{FF2B5EF4-FFF2-40B4-BE49-F238E27FC236}">
+                <a16:creationId xmlns:a16="http://schemas.microsoft.com/office/drawing/2014/main" id="{A4769B79-F2A5-4293-599B-27DF9FED6E67}"/>
+              </a:ext>
+              <a:ext uri="{C183D7F6-B498-43B3-948B-1728B52AA6E4}">
+                <adec:decorative xmlns:adec="http://schemas.microsoft.com/office/drawing/2017/decorative" val="1"/>
+              </a:ext>
+            </a:extLst>
+          </p:cNvPr>
+          <p:cNvSpPr/>
+          <p:nvPr>
+            <p:extLst>
+              <p:ext uri="{386F3935-93C4-4BCD-93E2-E3B085C9AB24}">
+                <p16:designElem xmlns:p16="http://schemas.microsoft.com/office/powerpoint/2015/main" val="1"/>
+              </p:ext>
+            </p:extLst>
+          </p:nvPr>
+        </p:nvSpPr>
+        <p:spPr>
+          <a:xfrm>
+            <a:off x="5646198" y="470517"/>
+            <a:ext cx="3160451" cy="3176127"/>
+          </a:xfrm>
+          <a:custGeom>
+            <a:avLst/>
+            <a:gdLst>
+              <a:gd name="connsiteX0" fmla="*/ 6861546 w 6861545"/>
+              <a:gd name="connsiteY0" fmla="*/ 6861546 h 6861545"/>
+              <a:gd name="connsiteX1" fmla="*/ 3435812 w 6861545"/>
+              <a:gd name="connsiteY1" fmla="*/ 6861546 h 6861545"/>
+              <a:gd name="connsiteX2" fmla="*/ 0 w 6861545"/>
+              <a:gd name="connsiteY2" fmla="*/ 3425734 h 6861545"/>
+              <a:gd name="connsiteX3" fmla="*/ 0 w 6861545"/>
+              <a:gd name="connsiteY3" fmla="*/ 0 h 6861545"/>
+              <a:gd name="connsiteX4" fmla="*/ 3425734 w 6861545"/>
+              <a:gd name="connsiteY4" fmla="*/ 0 h 6861545"/>
+              <a:gd name="connsiteX5" fmla="*/ 6861546 w 6861545"/>
+              <a:gd name="connsiteY5" fmla="*/ 3435812 h 6861545"/>
+              <a:gd name="connsiteX6" fmla="*/ 6861546 w 6861545"/>
+              <a:gd name="connsiteY6" fmla="*/ 6861546 h 6861545"/>
+            </a:gdLst>
+            <a:ahLst/>
+            <a:cxnLst>
+              <a:cxn ang="0">
+                <a:pos x="connsiteX0" y="connsiteY0"/>
+              </a:cxn>
+              <a:cxn ang="0">
+                <a:pos x="connsiteX1" y="connsiteY1"/>
+              </a:cxn>
+              <a:cxn ang="0">
+                <a:pos x="connsiteX2" y="connsiteY2"/>
+              </a:cxn>
+              <a:cxn ang="0">
+                <a:pos x="connsiteX3" y="connsiteY3"/>
+              </a:cxn>
+              <a:cxn ang="0">
+                <a:pos x="connsiteX4" y="connsiteY4"/>
+              </a:cxn>
+              <a:cxn ang="0">
+                <a:pos x="connsiteX5" y="connsiteY5"/>
+              </a:cxn>
+              <a:cxn ang="0">
+                <a:pos x="connsiteX6" y="connsiteY6"/>
+              </a:cxn>
+            </a:cxnLst>
+            <a:rect l="l" t="t" r="r" b="b"/>
+            <a:pathLst>
+              <a:path w="6861545" h="6861545">
+                <a:moveTo>
+                  <a:pt x="6861546" y="6861546"/>
+                </a:moveTo>
+                <a:lnTo>
+                  <a:pt x="3435812" y="6861546"/>
+                </a:lnTo>
+                <a:cubicBezTo>
+                  <a:pt x="1538245" y="6861546"/>
+                  <a:pt x="0" y="5323301"/>
+                  <a:pt x="0" y="3425734"/>
+                </a:cubicBezTo>
+                <a:lnTo>
+                  <a:pt x="0" y="0"/>
+                </a:lnTo>
+                <a:lnTo>
+                  <a:pt x="3425734" y="0"/>
+                </a:lnTo>
+                <a:cubicBezTo>
+                  <a:pt x="5323301" y="0"/>
+                  <a:pt x="6861546" y="1538245"/>
+                  <a:pt x="6861546" y="3435812"/>
+                </a:cubicBezTo>
+                <a:lnTo>
+                  <a:pt x="6861546" y="6861546"/>
+                </a:lnTo>
+                <a:close/>
+              </a:path>
+            </a:pathLst>
+          </a:custGeom>
+          <a:solidFill>
+            <a:srgbClr val="FFA33E"/>
+          </a:solidFill>
+          <a:ln w="38100" cap="flat">
+            <a:solidFill>
+              <a:srgbClr val="F7F7F7"/>
+            </a:solidFill>
+            <a:prstDash val="solid"/>
+            <a:miter/>
+          </a:ln>
+        </p:spPr>
+        <p:txBody>
+          <a:bodyPr rtlCol="0" anchor="ctr"/>
+          <a:lstStyle/>
+          <a:p>
+            <a:endParaRPr lang="en-US"/>
+          </a:p>
+        </p:txBody>
+      </p:sp>
       <p:pic>
         <p:nvPicPr>
-          <p:cNvPr id="7" name="Immagine 6">
+          <p:cNvPr id="33" name="Immagine 32">
             <a:extLst>
               <a:ext uri="{FF2B5EF4-FFF2-40B4-BE49-F238E27FC236}">
-                <a16:creationId xmlns:a16="http://schemas.microsoft.com/office/drawing/2014/main" id="{4BA564EA-C7D6-A25F-2599-C60F22D4F3BB}"/>
+                <a16:creationId xmlns:a16="http://schemas.microsoft.com/office/drawing/2014/main" id="{46D993C7-3D36-2D01-D142-67D575929F31}"/>
               </a:ext>
             </a:extLst>
           </p:cNvPr>
@@ -22170,7 +23511,7 @@
           <p:nvPr/>
         </p:nvPicPr>
         <p:blipFill>
-          <a:blip r:embed="rId2">
+          <a:blip r:embed="rId3">
             <a:extLst>
               <a:ext uri="{28A0092B-C50C-407E-A947-70E740481C1C}">
                 <a14:useLocalDpi xmlns:a14="http://schemas.microsoft.com/office/drawing/2010/main" val="0"/>
@@ -22194,7 +23535,7 @@
     </p:spTree>
     <p:extLst>
       <p:ext uri="{BB962C8B-B14F-4D97-AF65-F5344CB8AC3E}">
-        <p14:creationId xmlns:p14="http://schemas.microsoft.com/office/powerpoint/2010/main" val="795735383"/>
+        <p14:creationId xmlns:p14="http://schemas.microsoft.com/office/powerpoint/2010/main" val="3768709680"/>
       </p:ext>
     </p:extLst>
   </p:cSld>
@@ -22213,6 +23554,348 @@
       </p:transition>
     </mc:Fallback>
   </mc:AlternateContent>
+  <p:timing>
+    <p:tnLst>
+      <p:par>
+        <p:cTn id="1" dur="indefinite" restart="never" nodeType="tmRoot">
+          <p:childTnLst>
+            <p:seq concurrent="1" nextAc="seek">
+              <p:cTn id="2" dur="indefinite" nodeType="mainSeq">
+                <p:childTnLst>
+                  <p:par>
+                    <p:cTn id="3" fill="hold">
+                      <p:stCondLst>
+                        <p:cond delay="indefinite"/>
+                      </p:stCondLst>
+                      <p:childTnLst>
+                        <p:par>
+                          <p:cTn id="4" fill="hold">
+                            <p:stCondLst>
+                              <p:cond delay="0"/>
+                            </p:stCondLst>
+                            <p:childTnLst>
+                              <p:par>
+                                <p:cTn id="5" presetID="42" presetClass="entr" presetSubtype="0" fill="hold" grpId="0" nodeType="clickEffect">
+                                  <p:stCondLst>
+                                    <p:cond delay="0"/>
+                                  </p:stCondLst>
+                                  <p:childTnLst>
+                                    <p:set>
+                                      <p:cBhvr>
+                                        <p:cTn id="6" dur="1" fill="hold">
+                                          <p:stCondLst>
+                                            <p:cond delay="0"/>
+                                          </p:stCondLst>
+                                        </p:cTn>
+                                        <p:tgtEl>
+                                          <p:spTgt spid="3">
+                                            <p:txEl>
+                                              <p:pRg st="0" end="0"/>
+                                            </p:txEl>
+                                          </p:spTgt>
+                                        </p:tgtEl>
+                                        <p:attrNameLst>
+                                          <p:attrName>style.visibility</p:attrName>
+                                        </p:attrNameLst>
+                                      </p:cBhvr>
+                                      <p:to>
+                                        <p:strVal val="visible"/>
+                                      </p:to>
+                                    </p:set>
+                                    <p:animEffect transition="in" filter="fade">
+                                      <p:cBhvr>
+                                        <p:cTn id="7" dur="1000"/>
+                                        <p:tgtEl>
+                                          <p:spTgt spid="3">
+                                            <p:txEl>
+                                              <p:pRg st="0" end="0"/>
+                                            </p:txEl>
+                                          </p:spTgt>
+                                        </p:tgtEl>
+                                      </p:cBhvr>
+                                    </p:animEffect>
+                                    <p:anim calcmode="lin" valueType="num">
+                                      <p:cBhvr>
+                                        <p:cTn id="8" dur="1000" fill="hold"/>
+                                        <p:tgtEl>
+                                          <p:spTgt spid="3">
+                                            <p:txEl>
+                                              <p:pRg st="0" end="0"/>
+                                            </p:txEl>
+                                          </p:spTgt>
+                                        </p:tgtEl>
+                                        <p:attrNameLst>
+                                          <p:attrName>ppt_x</p:attrName>
+                                        </p:attrNameLst>
+                                      </p:cBhvr>
+                                      <p:tavLst>
+                                        <p:tav tm="0">
+                                          <p:val>
+                                            <p:strVal val="#ppt_x"/>
+                                          </p:val>
+                                        </p:tav>
+                                        <p:tav tm="100000">
+                                          <p:val>
+                                            <p:strVal val="#ppt_x"/>
+                                          </p:val>
+                                        </p:tav>
+                                      </p:tavLst>
+                                    </p:anim>
+                                    <p:anim calcmode="lin" valueType="num">
+                                      <p:cBhvr>
+                                        <p:cTn id="9" dur="1000" fill="hold"/>
+                                        <p:tgtEl>
+                                          <p:spTgt spid="3">
+                                            <p:txEl>
+                                              <p:pRg st="0" end="0"/>
+                                            </p:txEl>
+                                          </p:spTgt>
+                                        </p:tgtEl>
+                                        <p:attrNameLst>
+                                          <p:attrName>ppt_y</p:attrName>
+                                        </p:attrNameLst>
+                                      </p:cBhvr>
+                                      <p:tavLst>
+                                        <p:tav tm="0">
+                                          <p:val>
+                                            <p:strVal val="#ppt_y+.1"/>
+                                          </p:val>
+                                        </p:tav>
+                                        <p:tav tm="100000">
+                                          <p:val>
+                                            <p:strVal val="#ppt_y"/>
+                                          </p:val>
+                                        </p:tav>
+                                      </p:tavLst>
+                                    </p:anim>
+                                  </p:childTnLst>
+                                </p:cTn>
+                              </p:par>
+                              <p:par>
+                                <p:cTn id="10" presetID="42" presetClass="entr" presetSubtype="0" fill="hold" grpId="0" nodeType="withEffect">
+                                  <p:stCondLst>
+                                    <p:cond delay="0"/>
+                                  </p:stCondLst>
+                                  <p:childTnLst>
+                                    <p:set>
+                                      <p:cBhvr>
+                                        <p:cTn id="11" dur="1" fill="hold">
+                                          <p:stCondLst>
+                                            <p:cond delay="0"/>
+                                          </p:stCondLst>
+                                        </p:cTn>
+                                        <p:tgtEl>
+                                          <p:spTgt spid="3">
+                                            <p:txEl>
+                                              <p:pRg st="1" end="1"/>
+                                            </p:txEl>
+                                          </p:spTgt>
+                                        </p:tgtEl>
+                                        <p:attrNameLst>
+                                          <p:attrName>style.visibility</p:attrName>
+                                        </p:attrNameLst>
+                                      </p:cBhvr>
+                                      <p:to>
+                                        <p:strVal val="visible"/>
+                                      </p:to>
+                                    </p:set>
+                                    <p:animEffect transition="in" filter="fade">
+                                      <p:cBhvr>
+                                        <p:cTn id="12" dur="1000"/>
+                                        <p:tgtEl>
+                                          <p:spTgt spid="3">
+                                            <p:txEl>
+                                              <p:pRg st="1" end="1"/>
+                                            </p:txEl>
+                                          </p:spTgt>
+                                        </p:tgtEl>
+                                      </p:cBhvr>
+                                    </p:animEffect>
+                                    <p:anim calcmode="lin" valueType="num">
+                                      <p:cBhvr>
+                                        <p:cTn id="13" dur="1000" fill="hold"/>
+                                        <p:tgtEl>
+                                          <p:spTgt spid="3">
+                                            <p:txEl>
+                                              <p:pRg st="1" end="1"/>
+                                            </p:txEl>
+                                          </p:spTgt>
+                                        </p:tgtEl>
+                                        <p:attrNameLst>
+                                          <p:attrName>ppt_x</p:attrName>
+                                        </p:attrNameLst>
+                                      </p:cBhvr>
+                                      <p:tavLst>
+                                        <p:tav tm="0">
+                                          <p:val>
+                                            <p:strVal val="#ppt_x"/>
+                                          </p:val>
+                                        </p:tav>
+                                        <p:tav tm="100000">
+                                          <p:val>
+                                            <p:strVal val="#ppt_x"/>
+                                          </p:val>
+                                        </p:tav>
+                                      </p:tavLst>
+                                    </p:anim>
+                                    <p:anim calcmode="lin" valueType="num">
+                                      <p:cBhvr>
+                                        <p:cTn id="14" dur="1000" fill="hold"/>
+                                        <p:tgtEl>
+                                          <p:spTgt spid="3">
+                                            <p:txEl>
+                                              <p:pRg st="1" end="1"/>
+                                            </p:txEl>
+                                          </p:spTgt>
+                                        </p:tgtEl>
+                                        <p:attrNameLst>
+                                          <p:attrName>ppt_y</p:attrName>
+                                        </p:attrNameLst>
+                                      </p:cBhvr>
+                                      <p:tavLst>
+                                        <p:tav tm="0">
+                                          <p:val>
+                                            <p:strVal val="#ppt_y+.1"/>
+                                          </p:val>
+                                        </p:tav>
+                                        <p:tav tm="100000">
+                                          <p:val>
+                                            <p:strVal val="#ppt_y"/>
+                                          </p:val>
+                                        </p:tav>
+                                      </p:tavLst>
+                                    </p:anim>
+                                  </p:childTnLst>
+                                </p:cTn>
+                              </p:par>
+                              <p:par>
+                                <p:cTn id="15" presetID="42" presetClass="entr" presetSubtype="0" fill="hold" grpId="0" nodeType="withEffect">
+                                  <p:stCondLst>
+                                    <p:cond delay="0"/>
+                                  </p:stCondLst>
+                                  <p:childTnLst>
+                                    <p:set>
+                                      <p:cBhvr>
+                                        <p:cTn id="16" dur="1" fill="hold">
+                                          <p:stCondLst>
+                                            <p:cond delay="0"/>
+                                          </p:stCondLst>
+                                        </p:cTn>
+                                        <p:tgtEl>
+                                          <p:spTgt spid="3">
+                                            <p:txEl>
+                                              <p:pRg st="2" end="2"/>
+                                            </p:txEl>
+                                          </p:spTgt>
+                                        </p:tgtEl>
+                                        <p:attrNameLst>
+                                          <p:attrName>style.visibility</p:attrName>
+                                        </p:attrNameLst>
+                                      </p:cBhvr>
+                                      <p:to>
+                                        <p:strVal val="visible"/>
+                                      </p:to>
+                                    </p:set>
+                                    <p:animEffect transition="in" filter="fade">
+                                      <p:cBhvr>
+                                        <p:cTn id="17" dur="1000"/>
+                                        <p:tgtEl>
+                                          <p:spTgt spid="3">
+                                            <p:txEl>
+                                              <p:pRg st="2" end="2"/>
+                                            </p:txEl>
+                                          </p:spTgt>
+                                        </p:tgtEl>
+                                      </p:cBhvr>
+                                    </p:animEffect>
+                                    <p:anim calcmode="lin" valueType="num">
+                                      <p:cBhvr>
+                                        <p:cTn id="18" dur="1000" fill="hold"/>
+                                        <p:tgtEl>
+                                          <p:spTgt spid="3">
+                                            <p:txEl>
+                                              <p:pRg st="2" end="2"/>
+                                            </p:txEl>
+                                          </p:spTgt>
+                                        </p:tgtEl>
+                                        <p:attrNameLst>
+                                          <p:attrName>ppt_x</p:attrName>
+                                        </p:attrNameLst>
+                                      </p:cBhvr>
+                                      <p:tavLst>
+                                        <p:tav tm="0">
+                                          <p:val>
+                                            <p:strVal val="#ppt_x"/>
+                                          </p:val>
+                                        </p:tav>
+                                        <p:tav tm="100000">
+                                          <p:val>
+                                            <p:strVal val="#ppt_x"/>
+                                          </p:val>
+                                        </p:tav>
+                                      </p:tavLst>
+                                    </p:anim>
+                                    <p:anim calcmode="lin" valueType="num">
+                                      <p:cBhvr>
+                                        <p:cTn id="19" dur="1000" fill="hold"/>
+                                        <p:tgtEl>
+                                          <p:spTgt spid="3">
+                                            <p:txEl>
+                                              <p:pRg st="2" end="2"/>
+                                            </p:txEl>
+                                          </p:spTgt>
+                                        </p:tgtEl>
+                                        <p:attrNameLst>
+                                          <p:attrName>ppt_y</p:attrName>
+                                        </p:attrNameLst>
+                                      </p:cBhvr>
+                                      <p:tavLst>
+                                        <p:tav tm="0">
+                                          <p:val>
+                                            <p:strVal val="#ppt_y+.1"/>
+                                          </p:val>
+                                        </p:tav>
+                                        <p:tav tm="100000">
+                                          <p:val>
+                                            <p:strVal val="#ppt_y"/>
+                                          </p:val>
+                                        </p:tav>
+                                      </p:tavLst>
+                                    </p:anim>
+                                  </p:childTnLst>
+                                </p:cTn>
+                              </p:par>
+                            </p:childTnLst>
+                          </p:cTn>
+                        </p:par>
+                      </p:childTnLst>
+                    </p:cTn>
+                  </p:par>
+                </p:childTnLst>
+              </p:cTn>
+              <p:prevCondLst>
+                <p:cond evt="onPrev" delay="0">
+                  <p:tgtEl>
+                    <p:sldTgt/>
+                  </p:tgtEl>
+                </p:cond>
+              </p:prevCondLst>
+              <p:nextCondLst>
+                <p:cond evt="onNext" delay="0">
+                  <p:tgtEl>
+                    <p:sldTgt/>
+                  </p:tgtEl>
+                </p:cond>
+              </p:nextCondLst>
+            </p:seq>
+          </p:childTnLst>
+        </p:cTn>
+      </p:par>
+    </p:tnLst>
+    <p:bldLst>
+      <p:bldP spid="3" grpId="0" build="p"/>
+    </p:bldLst>
+  </p:timing>
 </p:sld>
 </file>
 

</xml_diff>